<commit_message>
singleton 토론 자료 update
</commit_message>
<xml_diff>
--- a/singleton에 대한 토론 자료.pptx
+++ b/singleton에 대한 토론 자료.pptx
@@ -14,10 +14,11 @@
     <p:sldId id="263" r:id="rId8"/>
     <p:sldId id="264" r:id="rId9"/>
     <p:sldId id="265" r:id="rId10"/>
-    <p:sldId id="266" r:id="rId11"/>
-    <p:sldId id="267" r:id="rId12"/>
-    <p:sldId id="268" r:id="rId13"/>
-    <p:sldId id="269" r:id="rId14"/>
+    <p:sldId id="270" r:id="rId11"/>
+    <p:sldId id="266" r:id="rId12"/>
+    <p:sldId id="267" r:id="rId13"/>
+    <p:sldId id="268" r:id="rId14"/>
+    <p:sldId id="269" r:id="rId15"/>
   </p:sldIdLst>
   <p:sldSz cx="12192000" cy="6858000"/>
   <p:notesSz cx="6858000" cy="9144000"/>
@@ -116,6 +117,11 @@
       </a:defRPr>
     </a:lvl9pPr>
   </p:defaultTextStyle>
+  <p:extLst>
+    <p:ext uri="{EFAFB233-063F-42B5-8137-9DF3F51BA10A}">
+      <p15:sldGuideLst xmlns:p15="http://schemas.microsoft.com/office/powerpoint/2012/main"/>
+    </p:ext>
+  </p:extLst>
 </p:presentation>
 </file>
 
@@ -3035,6 +3041,241 @@
       </p:grpSpPr>
       <p:sp>
         <p:nvSpPr>
+          <p:cNvPr id="9" name="TextBox 8"/>
+          <p:cNvSpPr txBox="1"/>
+          <p:nvPr/>
+        </p:nvSpPr>
+        <p:spPr>
+          <a:xfrm>
+            <a:off x="2124909" y="2324901"/>
+            <a:ext cx="8608291" cy="1815882"/>
+          </a:xfrm>
+          <a:prstGeom prst="rect">
+            <a:avLst/>
+          </a:prstGeom>
+          <a:noFill/>
+        </p:spPr>
+        <p:txBody>
+          <a:bodyPr wrap="square" rtlCol="0">
+            <a:spAutoFit/>
+          </a:bodyPr>
+          <a:lstStyle/>
+          <a:p>
+            <a:r>
+              <a:rPr lang="ko-KR" altLang="en-US" sz="1400" dirty="0" smtClean="0"/>
+              <a:t>근데 사실 </a:t>
+            </a:r>
+            <a:r>
+              <a:rPr lang="ko-KR" altLang="en-US" sz="1400" dirty="0" err="1" smtClean="0"/>
+              <a:t>프리팹에</a:t>
+            </a:r>
+            <a:r>
+              <a:rPr lang="ko-KR" altLang="en-US" sz="1400" dirty="0" smtClean="0"/>
+              <a:t> 관해서는 </a:t>
+            </a:r>
+            <a:endParaRPr lang="en-US" altLang="ko-KR" sz="1400" dirty="0" smtClean="0"/>
+          </a:p>
+          <a:p>
+            <a:r>
+              <a:rPr lang="ko-KR" altLang="en-US" sz="1400" dirty="0" smtClean="0"/>
+              <a:t> </a:t>
+            </a:r>
+            <a:r>
+              <a:rPr lang="en-US" altLang="ko-KR" sz="1400" dirty="0" smtClean="0"/>
+              <a:t>Resources </a:t>
+            </a:r>
+            <a:r>
+              <a:rPr lang="ko-KR" altLang="en-US" sz="1400" dirty="0" smtClean="0"/>
+              <a:t>에서 </a:t>
+            </a:r>
+            <a:r>
+              <a:rPr lang="ko-KR" altLang="en-US" sz="1400" dirty="0" err="1" smtClean="0"/>
+              <a:t>객체별로</a:t>
+            </a:r>
+            <a:r>
+              <a:rPr lang="ko-KR" altLang="en-US" sz="1400" dirty="0" smtClean="0"/>
+              <a:t> 파일을 나눠놓고 </a:t>
+            </a:r>
+            <a:r>
+              <a:rPr lang="en-US" altLang="ko-KR" sz="1400" dirty="0" err="1" smtClean="0"/>
+              <a:t>Resources.</a:t>
+            </a:r>
+            <a:r>
+              <a:rPr lang="en-US" altLang="ko-KR" sz="1400" dirty="0" err="1" smtClean="0"/>
+              <a:t>LoadAll</a:t>
+            </a:r>
+            <a:r>
+              <a:rPr lang="en-US" altLang="ko-KR" sz="1400" dirty="0" smtClean="0"/>
+              <a:t> </a:t>
+            </a:r>
+            <a:r>
+              <a:rPr lang="ko-KR" altLang="en-US" sz="1400" dirty="0" smtClean="0"/>
+              <a:t>로 호출한다면 </a:t>
+            </a:r>
+            <a:r>
+              <a:rPr lang="ko-KR" altLang="en-US" sz="1400" dirty="0" err="1" smtClean="0"/>
+              <a:t>괜찮을겁니다</a:t>
+            </a:r>
+            <a:r>
+              <a:rPr lang="en-US" altLang="ko-KR" sz="1400" dirty="0" smtClean="0"/>
+              <a:t>. </a:t>
+            </a:r>
+          </a:p>
+          <a:p>
+            <a:r>
+              <a:rPr lang="ko-KR" altLang="en-US" sz="1400" dirty="0" smtClean="0"/>
+              <a:t>그렇게 하면 </a:t>
+            </a:r>
+            <a:r>
+              <a:rPr lang="ko-KR" altLang="en-US" sz="1400" dirty="0" err="1" smtClean="0"/>
+              <a:t>기획님들이</a:t>
+            </a:r>
+            <a:r>
+              <a:rPr lang="ko-KR" altLang="en-US" sz="1400" dirty="0" smtClean="0"/>
+              <a:t>  </a:t>
+            </a:r>
+            <a:r>
+              <a:rPr lang="ko-KR" altLang="en-US" sz="1400" dirty="0" smtClean="0"/>
+              <a:t>만약에 애니메이션을 바꾸고 싶다 </a:t>
+            </a:r>
+            <a:r>
+              <a:rPr lang="ko-KR" altLang="en-US" sz="1400" dirty="0" err="1" smtClean="0"/>
+              <a:t>했을때</a:t>
+            </a:r>
+            <a:endParaRPr lang="en-US" altLang="ko-KR" sz="1400" dirty="0" smtClean="0"/>
+          </a:p>
+          <a:p>
+            <a:r>
+              <a:rPr lang="en-US" altLang="ko-KR" sz="1400" dirty="0" err="1" smtClean="0"/>
+              <a:t>Flymonster</a:t>
+            </a:r>
+            <a:r>
+              <a:rPr lang="en-US" altLang="ko-KR" sz="1400" dirty="0" smtClean="0"/>
+              <a:t> </a:t>
+            </a:r>
+            <a:r>
+              <a:rPr lang="ko-KR" altLang="en-US" sz="1400" dirty="0" smtClean="0"/>
+              <a:t>폴더에서 애니메이션 파일만 교체하면 </a:t>
+            </a:r>
+            <a:r>
+              <a:rPr lang="ko-KR" altLang="en-US" sz="1400" dirty="0" err="1" smtClean="0"/>
+              <a:t>되니깐용</a:t>
+            </a:r>
+            <a:r>
+              <a:rPr lang="en-US" altLang="ko-KR" sz="1400" dirty="0" smtClean="0"/>
+              <a:t>.</a:t>
+            </a:r>
+          </a:p>
+          <a:p>
+            <a:endParaRPr lang="en-US" altLang="ko-KR" sz="1400" dirty="0"/>
+          </a:p>
+          <a:p>
+            <a:r>
+              <a:rPr lang="ko-KR" altLang="en-US" sz="1400" dirty="0" smtClean="0"/>
+              <a:t>만약 정말로 </a:t>
+            </a:r>
+            <a:r>
+              <a:rPr lang="ko-KR" altLang="en-US" sz="1400" dirty="0" err="1" smtClean="0"/>
+              <a:t>인스펙터로</a:t>
+            </a:r>
+            <a:r>
+              <a:rPr lang="ko-KR" altLang="en-US" sz="1400" dirty="0" smtClean="0"/>
+              <a:t> 쉽게 수정이 절대 </a:t>
+            </a:r>
+            <a:r>
+              <a:rPr lang="ko-KR" altLang="en-US" sz="1400" dirty="0" err="1" smtClean="0"/>
+              <a:t>안일어날</a:t>
+            </a:r>
+            <a:r>
+              <a:rPr lang="ko-KR" altLang="en-US" sz="1400" dirty="0" smtClean="0"/>
+              <a:t> 필요가 절대로 </a:t>
+            </a:r>
+            <a:r>
+              <a:rPr lang="ko-KR" altLang="en-US" sz="1400" dirty="0" err="1" smtClean="0"/>
+              <a:t>없을것이다</a:t>
+            </a:r>
+            <a:r>
+              <a:rPr lang="ko-KR" altLang="en-US" sz="1400" dirty="0" smtClean="0"/>
+              <a:t> </a:t>
+            </a:r>
+            <a:endParaRPr lang="en-US" altLang="ko-KR" sz="1400" dirty="0" smtClean="0"/>
+          </a:p>
+          <a:p>
+            <a:r>
+              <a:rPr lang="ko-KR" altLang="en-US" sz="1400" dirty="0" smtClean="0"/>
+              <a:t>나는 매니저에 대한 오브젝트는 메인매니저만 생성할 것이다 하면 </a:t>
+            </a:r>
+            <a:r>
+              <a:rPr lang="en-US" altLang="ko-KR" sz="1400" dirty="0" smtClean="0"/>
+              <a:t>singleton</a:t>
+            </a:r>
+            <a:r>
+              <a:rPr lang="ko-KR" altLang="en-US" sz="1400" dirty="0" smtClean="0"/>
+              <a:t>에서</a:t>
+            </a:r>
+            <a:endParaRPr lang="en-US" altLang="ko-KR" sz="1400" dirty="0" smtClean="0"/>
+          </a:p>
+          <a:p>
+            <a:r>
+              <a:rPr lang="ko-KR" altLang="en-US" sz="1400" dirty="0" smtClean="0"/>
+              <a:t> </a:t>
+            </a:r>
+            <a:r>
+              <a:rPr lang="en-US" altLang="ko-KR" sz="1400" dirty="0" smtClean="0"/>
+              <a:t>new </a:t>
+            </a:r>
+            <a:r>
+              <a:rPr lang="en-US" altLang="ko-KR" sz="1400" dirty="0" err="1" smtClean="0"/>
+              <a:t>gameobject</a:t>
+            </a:r>
+            <a:r>
+              <a:rPr lang="en-US" altLang="ko-KR" sz="1400" dirty="0"/>
+              <a:t> </a:t>
+            </a:r>
+            <a:r>
+              <a:rPr lang="ko-KR" altLang="en-US" sz="1400" dirty="0" smtClean="0"/>
+              <a:t>부분을 없애고 조금 수정하면 됩니다</a:t>
+            </a:r>
+            <a:r>
+              <a:rPr lang="en-US" altLang="ko-KR" sz="1400" dirty="0" smtClean="0"/>
+              <a:t>.</a:t>
+            </a:r>
+            <a:endParaRPr lang="ko-KR" altLang="en-US" dirty="0"/>
+          </a:p>
+        </p:txBody>
+      </p:sp>
+    </p:spTree>
+    <p:extLst>
+      <p:ext uri="{BB962C8B-B14F-4D97-AF65-F5344CB8AC3E}">
+        <p14:creationId xmlns:p14="http://schemas.microsoft.com/office/powerpoint/2010/main" val="4067178026"/>
+      </p:ext>
+    </p:extLst>
+  </p:cSld>
+  <p:clrMapOvr>
+    <a:masterClrMapping/>
+  </p:clrMapOvr>
+</p:sld>
+</file>
+
+<file path=ppt/slides/slide11.xml><?xml version="1.0" encoding="utf-8"?>
+<p:sld xmlns:a="http://schemas.openxmlformats.org/drawingml/2006/main" xmlns:r="http://schemas.openxmlformats.org/officeDocument/2006/relationships" xmlns:p="http://schemas.openxmlformats.org/presentationml/2006/main">
+  <p:cSld>
+    <p:spTree>
+      <p:nvGrpSpPr>
+        <p:cNvPr id="1" name=""/>
+        <p:cNvGrpSpPr/>
+        <p:nvPr/>
+      </p:nvGrpSpPr>
+      <p:grpSpPr>
+        <a:xfrm>
+          <a:off x="0" y="0"/>
+          <a:ext cx="0" cy="0"/>
+          <a:chOff x="0" y="0"/>
+          <a:chExt cx="0" cy="0"/>
+        </a:xfrm>
+      </p:grpSpPr>
+      <p:sp>
+        <p:nvSpPr>
           <p:cNvPr id="2" name="TextBox 1"/>
           <p:cNvSpPr txBox="1"/>
           <p:nvPr/>
@@ -3228,7 +3469,7 @@
 </p:sld>
 </file>
 
-<file path=ppt/slides/slide11.xml><?xml version="1.0" encoding="utf-8"?>
+<file path=ppt/slides/slide12.xml><?xml version="1.0" encoding="utf-8"?>
 <p:sld xmlns:a="http://schemas.openxmlformats.org/drawingml/2006/main" xmlns:r="http://schemas.openxmlformats.org/officeDocument/2006/relationships" xmlns:p="http://schemas.openxmlformats.org/presentationml/2006/main">
   <p:cSld>
     <p:spTree>
@@ -3370,7 +3611,7 @@
 </p:sld>
 </file>
 
-<file path=ppt/slides/slide12.xml><?xml version="1.0" encoding="utf-8"?>
+<file path=ppt/slides/slide13.xml><?xml version="1.0" encoding="utf-8"?>
 <p:sld xmlns:a="http://schemas.openxmlformats.org/drawingml/2006/main" xmlns:r="http://schemas.openxmlformats.org/officeDocument/2006/relationships" xmlns:p="http://schemas.openxmlformats.org/presentationml/2006/main">
   <p:cSld>
     <p:spTree>
@@ -3536,7 +3777,7 @@
 </p:sld>
 </file>
 
-<file path=ppt/slides/slide13.xml><?xml version="1.0" encoding="utf-8"?>
+<file path=ppt/slides/slide14.xml><?xml version="1.0" encoding="utf-8"?>
 <p:sld xmlns:a="http://schemas.openxmlformats.org/drawingml/2006/main" xmlns:r="http://schemas.openxmlformats.org/officeDocument/2006/relationships" xmlns:p="http://schemas.openxmlformats.org/presentationml/2006/main">
   <p:cSld>
     <p:spTree>
@@ -5219,11 +5460,7 @@
           <a:p>
             <a:r>
               <a:rPr lang="ko-KR" altLang="en-US" sz="1400" dirty="0" smtClean="0"/>
-              <a:t>어디까지나 예를 든거지  </a:t>
-            </a:r>
-            <a:r>
-              <a:rPr lang="ko-KR" altLang="en-US" sz="1400" dirty="0" smtClean="0"/>
-              <a:t>프리팹처리를 코드로 해야하면 코드로 하면 됩니다</a:t>
+              <a:t>어디까지나 예를 든거지  프리팹처리를 코드로 해야하면 코드로 하면 됩니다</a:t>
             </a:r>
             <a:r>
               <a:rPr lang="en-US" altLang="ko-KR" sz="1400" dirty="0" smtClean="0"/>

</xml_diff>

<commit_message>
client update singletonver3 은 싱글톤 패턴에 부합하지 않음.
</commit_message>
<xml_diff>
--- a/singleton에 대한 토론 자료.pptx
+++ b/singleton에 대한 토론 자료.pptx
@@ -19,6 +19,7 @@
     <p:sldId id="267" r:id="rId13"/>
     <p:sldId id="268" r:id="rId14"/>
     <p:sldId id="269" r:id="rId15"/>
+    <p:sldId id="271" r:id="rId16"/>
   </p:sldIdLst>
   <p:sldSz cx="12192000" cy="6858000"/>
   <p:notesSz cx="6858000" cy="9144000"/>
@@ -3098,11 +3099,7 @@
             </a:r>
             <a:r>
               <a:rPr lang="en-US" altLang="ko-KR" sz="1400" dirty="0" err="1" smtClean="0"/>
-              <a:t>Resources.</a:t>
-            </a:r>
-            <a:r>
-              <a:rPr lang="en-US" altLang="ko-KR" sz="1400" dirty="0" err="1" smtClean="0"/>
-              <a:t>LoadAll</a:t>
+              <a:t>Resources.LoadAll</a:t>
             </a:r>
             <a:r>
               <a:rPr lang="en-US" altLang="ko-KR" sz="1400" dirty="0" smtClean="0"/>
@@ -3132,11 +3129,7 @@
             </a:r>
             <a:r>
               <a:rPr lang="ko-KR" altLang="en-US" sz="1400" dirty="0" smtClean="0"/>
-              <a:t>  </a:t>
-            </a:r>
-            <a:r>
-              <a:rPr lang="ko-KR" altLang="en-US" sz="1400" dirty="0" smtClean="0"/>
-              <a:t>만약에 애니메이션을 바꾸고 싶다 </a:t>
+              <a:t>  만약에 애니메이션을 바꾸고 싶다 </a:t>
             </a:r>
             <a:r>
               <a:rPr lang="ko-KR" altLang="en-US" sz="1400" dirty="0" err="1" smtClean="0"/>
@@ -3794,6 +3787,144 @@
           <a:chExt cx="0" cy="0"/>
         </a:xfrm>
       </p:grpSpPr>
+      <p:pic>
+        <p:nvPicPr>
+          <p:cNvPr id="3" name="그림 2"/>
+          <p:cNvPicPr/>
+          <p:nvPr/>
+        </p:nvPicPr>
+        <p:blipFill>
+          <a:blip r:embed="rId2">
+            <a:extLst>
+              <a:ext uri="{28A0092B-C50C-407E-A947-70E740481C1C}">
+                <a14:useLocalDpi xmlns:a14="http://schemas.microsoft.com/office/drawing/2010/main" val="0"/>
+              </a:ext>
+            </a:extLst>
+          </a:blip>
+          <a:stretch>
+            <a:fillRect/>
+          </a:stretch>
+        </p:blipFill>
+        <p:spPr>
+          <a:xfrm>
+            <a:off x="121766" y="970521"/>
+            <a:ext cx="3867150" cy="3162300"/>
+          </a:xfrm>
+          <a:prstGeom prst="rect">
+            <a:avLst/>
+          </a:prstGeom>
+        </p:spPr>
+      </p:pic>
+      <p:sp>
+        <p:nvSpPr>
+          <p:cNvPr id="4" name="TextBox 3"/>
+          <p:cNvSpPr txBox="1"/>
+          <p:nvPr/>
+        </p:nvSpPr>
+        <p:spPr>
+          <a:xfrm>
+            <a:off x="226541" y="4559643"/>
+            <a:ext cx="8637373" cy="923330"/>
+          </a:xfrm>
+          <a:prstGeom prst="rect">
+            <a:avLst/>
+          </a:prstGeom>
+          <a:noFill/>
+        </p:spPr>
+        <p:txBody>
+          <a:bodyPr wrap="square" rtlCol="0">
+            <a:spAutoFit/>
+          </a:bodyPr>
+          <a:lstStyle/>
+          <a:p>
+            <a:r>
+              <a:rPr lang="ko-KR" altLang="ko-KR" dirty="0" err="1"/>
+              <a:t>인스펙터</a:t>
+            </a:r>
+            <a:r>
+              <a:rPr lang="en-US" altLang="ko-KR" dirty="0"/>
+              <a:t>  </a:t>
+            </a:r>
+            <a:r>
+              <a:rPr lang="ko-KR" altLang="ko-KR" dirty="0"/>
+              <a:t>디버깅용으로 </a:t>
+            </a:r>
+            <a:r>
+              <a:rPr lang="ko-KR" altLang="ko-KR" dirty="0" err="1"/>
+              <a:t>쓸수도</a:t>
+            </a:r>
+            <a:r>
+              <a:rPr lang="ko-KR" altLang="ko-KR" dirty="0"/>
+              <a:t> 있다</a:t>
+            </a:r>
+            <a:r>
+              <a:rPr lang="en-US" altLang="ko-KR" dirty="0"/>
+              <a:t>. </a:t>
+            </a:r>
+            <a:endParaRPr lang="en-US" altLang="ko-KR" dirty="0" smtClean="0"/>
+          </a:p>
+          <a:p>
+            <a:r>
+              <a:rPr lang="ko-KR" altLang="ko-KR" dirty="0" err="1" smtClean="0"/>
+              <a:t>위의걸로</a:t>
+            </a:r>
+            <a:r>
+              <a:rPr lang="ko-KR" altLang="ko-KR" dirty="0" smtClean="0"/>
+              <a:t> </a:t>
+            </a:r>
+            <a:r>
+              <a:rPr lang="ko-KR" altLang="ko-KR" dirty="0"/>
+              <a:t>하이어라키에 안보이게 </a:t>
+            </a:r>
+            <a:r>
+              <a:rPr lang="ko-KR" altLang="ko-KR" dirty="0" err="1"/>
+              <a:t>할수도</a:t>
+            </a:r>
+            <a:r>
+              <a:rPr lang="ko-KR" altLang="ko-KR" dirty="0"/>
+              <a:t> 있음</a:t>
+            </a:r>
+            <a:r>
+              <a:rPr lang="en-US" altLang="ko-KR" dirty="0"/>
+              <a:t>.</a:t>
+            </a:r>
+            <a:endParaRPr lang="ko-KR" altLang="ko-KR" dirty="0"/>
+          </a:p>
+          <a:p>
+            <a:endParaRPr lang="ko-KR" altLang="en-US" dirty="0"/>
+          </a:p>
+        </p:txBody>
+      </p:sp>
+    </p:spTree>
+    <p:extLst>
+      <p:ext uri="{BB962C8B-B14F-4D97-AF65-F5344CB8AC3E}">
+        <p14:creationId xmlns:p14="http://schemas.microsoft.com/office/powerpoint/2010/main" val="3596363522"/>
+      </p:ext>
+    </p:extLst>
+  </p:cSld>
+  <p:clrMapOvr>
+    <a:masterClrMapping/>
+  </p:clrMapOvr>
+</p:sld>
+</file>
+
+<file path=ppt/slides/slide15.xml><?xml version="1.0" encoding="utf-8"?>
+<p:sld xmlns:a="http://schemas.openxmlformats.org/drawingml/2006/main" xmlns:r="http://schemas.openxmlformats.org/officeDocument/2006/relationships" xmlns:p="http://schemas.openxmlformats.org/presentationml/2006/main">
+  <p:cSld>
+    <p:spTree>
+      <p:nvGrpSpPr>
+        <p:cNvPr id="1" name=""/>
+        <p:cNvGrpSpPr/>
+        <p:nvPr/>
+      </p:nvGrpSpPr>
+      <p:grpSpPr>
+        <a:xfrm>
+          <a:off x="0" y="0"/>
+          <a:ext cx="0" cy="0"/>
+          <a:chOff x="0" y="0"/>
+          <a:chExt cx="0" cy="0"/>
+        </a:xfrm>
+      </p:grpSpPr>
       <p:sp>
         <p:nvSpPr>
           <p:cNvPr id="2" name="TextBox 1"/>
@@ -3839,7 +3970,7 @@
     </p:spTree>
     <p:extLst>
       <p:ext uri="{BB962C8B-B14F-4D97-AF65-F5344CB8AC3E}">
-        <p14:creationId xmlns:p14="http://schemas.microsoft.com/office/powerpoint/2010/main" val="3596363522"/>
+        <p14:creationId xmlns:p14="http://schemas.microsoft.com/office/powerpoint/2010/main" val="3545755301"/>
       </p:ext>
     </p:extLst>
   </p:cSld>

</xml_diff>